<commit_message>
random stuff from old onedrive
</commit_message>
<xml_diff>
--- a/ClassMaterials/RefParamsCorountines/37_refParams_coroutines.pptx
+++ b/ClassMaterials/RefParamsCorountines/37_refParams_coroutines.pptx
@@ -191,16 +191,32 @@
 </p:presentation>
 </file>
 
-<file path=ppt/revisionInfo.xml><?xml version="1.0" encoding="utf-8"?>
-<p1510:revInfo xmlns:a="http://schemas.openxmlformats.org/drawingml/2006/main" xmlns:r="http://schemas.openxmlformats.org/officeDocument/2006/relationships" xmlns:p1510="http://schemas.microsoft.com/office/powerpoint/2015/10/main">
-  <p1510:revLst>
-    <p1510:client id="{0BFB2295-5BD8-4317-B4D2-52CE0DAFAEB3}" v="1" dt="2021-11-11T14:40:31.034"/>
-  </p1510:revLst>
-</p1510:revInfo>
-</file>
-
 <file path=ppt/changesInfos/changesInfo1.xml><?xml version="1.0" encoding="utf-8"?>
 <pc:chgInfo xmlns:a="http://schemas.openxmlformats.org/drawingml/2006/main" xmlns:r="http://schemas.openxmlformats.org/officeDocument/2006/relationships" xmlns:ac="http://schemas.microsoft.com/office/drawing/2013/main/command" xmlns:pc="http://schemas.microsoft.com/office/powerpoint/2013/main/command">
+  <pc:docChgLst>
+    <pc:chgData name="Hewner, Mike" userId="7f3f83dd-6dfb-4127-a87f-c1714bd4fac9" providerId="ADAL" clId="{76FEDA98-5770-4FC9-97FA-A79D546FBB83}"/>
+    <pc:docChg chg="modSld">
+      <pc:chgData name="Hewner, Mike" userId="7f3f83dd-6dfb-4127-a87f-c1714bd4fac9" providerId="ADAL" clId="{76FEDA98-5770-4FC9-97FA-A79D546FBB83}" dt="2022-02-17T15:52:01.625" v="4" actId="20577"/>
+      <pc:docMkLst>
+        <pc:docMk/>
+      </pc:docMkLst>
+      <pc:sldChg chg="modSp mod">
+        <pc:chgData name="Hewner, Mike" userId="7f3f83dd-6dfb-4127-a87f-c1714bd4fac9" providerId="ADAL" clId="{76FEDA98-5770-4FC9-97FA-A79D546FBB83}" dt="2022-02-17T15:52:01.625" v="4" actId="20577"/>
+        <pc:sldMkLst>
+          <pc:docMk/>
+          <pc:sldMk cId="3041442255" sldId="456"/>
+        </pc:sldMkLst>
+        <pc:spChg chg="mod">
+          <ac:chgData name="Hewner, Mike" userId="7f3f83dd-6dfb-4127-a87f-c1714bd4fac9" providerId="ADAL" clId="{76FEDA98-5770-4FC9-97FA-A79D546FBB83}" dt="2022-02-17T15:52:01.625" v="4" actId="20577"/>
+          <ac:spMkLst>
+            <pc:docMk/>
+            <pc:sldMk cId="3041442255" sldId="456"/>
+            <ac:spMk id="3" creationId="{F443D27E-0E16-482F-B4CC-A5D0813F0C6B}"/>
+          </ac:spMkLst>
+        </pc:spChg>
+      </pc:sldChg>
+    </pc:docChg>
+  </pc:docChgLst>
   <pc:docChgLst>
     <pc:chgData name="Hewner, Mike" userId="7f3f83dd-6dfb-4127-a87f-c1714bd4fac9" providerId="ADAL" clId="{0BFB2295-5BD8-4317-B4D2-52CE0DAFAEB3}"/>
     <pc:docChg chg="custSel addSld delSld modSld">
@@ -6460,7 +6476,15 @@
           <a:p>
             <a:r>
               <a:rPr lang="en-US" dirty="0"/>
-              <a:t>Teaching a course for the first time is always a little rough…especially a course with a lot of difficult content</a:t>
+              <a:t>Teaching a course for the </a:t>
+            </a:r>
+            <a:r>
+              <a:rPr lang="en-US"/>
+              <a:t>first few times </a:t>
+            </a:r>
+            <a:r>
+              <a:rPr lang="en-US" dirty="0"/>
+              <a:t>is always a little rough…especially a course with a lot of difficult content</a:t>
             </a:r>
           </a:p>
           <a:p>

</xml_diff>

<commit_message>
random changes in the repo:
</commit_message>
<xml_diff>
--- a/ClassMaterials/RefParamsCorountines/37_refParams_coroutines.pptx
+++ b/ClassMaterials/RefParamsCorountines/37_refParams_coroutines.pptx
@@ -189,67 +189,6 @@
 
 <file path=ppt/changesInfos/changesInfo1.xml><?xml version="1.0" encoding="utf-8"?>
 <pc:chgInfo xmlns:a="http://schemas.openxmlformats.org/drawingml/2006/main" xmlns:r="http://schemas.openxmlformats.org/officeDocument/2006/relationships" xmlns:ac="http://schemas.microsoft.com/office/drawing/2013/main/command" xmlns:pc="http://schemas.microsoft.com/office/powerpoint/2013/main/command">
-  <pc:docChgLst>
-    <pc:chgData name="Mike Hewner" userId="7f3f83dd-6dfb-4127-a87f-c1714bd4fac9" providerId="ADAL" clId="{1757374B-378E-457D-BEFA-6C2F4048CEC8}"/>
-    <pc:docChg chg="delSld">
-      <pc:chgData name="Mike Hewner" userId="7f3f83dd-6dfb-4127-a87f-c1714bd4fac9" providerId="ADAL" clId="{1757374B-378E-457D-BEFA-6C2F4048CEC8}" dt="2022-10-31T13:47:56.073" v="1" actId="47"/>
-      <pc:docMkLst>
-        <pc:docMk/>
-      </pc:docMkLst>
-      <pc:sldChg chg="del">
-        <pc:chgData name="Mike Hewner" userId="7f3f83dd-6dfb-4127-a87f-c1714bd4fac9" providerId="ADAL" clId="{1757374B-378E-457D-BEFA-6C2F4048CEC8}" dt="2022-10-31T13:47:56.073" v="1" actId="47"/>
-        <pc:sldMkLst>
-          <pc:docMk/>
-          <pc:sldMk cId="3014537070" sldId="448"/>
-        </pc:sldMkLst>
-      </pc:sldChg>
-      <pc:sldChg chg="del">
-        <pc:chgData name="Mike Hewner" userId="7f3f83dd-6dfb-4127-a87f-c1714bd4fac9" providerId="ADAL" clId="{1757374B-378E-457D-BEFA-6C2F4048CEC8}" dt="2022-10-31T13:47:56.073" v="1" actId="47"/>
-        <pc:sldMkLst>
-          <pc:docMk/>
-          <pc:sldMk cId="387688988" sldId="450"/>
-        </pc:sldMkLst>
-      </pc:sldChg>
-      <pc:sldChg chg="del">
-        <pc:chgData name="Mike Hewner" userId="7f3f83dd-6dfb-4127-a87f-c1714bd4fac9" providerId="ADAL" clId="{1757374B-378E-457D-BEFA-6C2F4048CEC8}" dt="2022-10-31T13:47:56.073" v="1" actId="47"/>
-        <pc:sldMkLst>
-          <pc:docMk/>
-          <pc:sldMk cId="1500992104" sldId="451"/>
-        </pc:sldMkLst>
-      </pc:sldChg>
-      <pc:sldChg chg="del">
-        <pc:chgData name="Mike Hewner" userId="7f3f83dd-6dfb-4127-a87f-c1714bd4fac9" providerId="ADAL" clId="{1757374B-378E-457D-BEFA-6C2F4048CEC8}" dt="2022-10-31T13:47:04.952" v="0" actId="47"/>
-        <pc:sldMkLst>
-          <pc:docMk/>
-          <pc:sldMk cId="2142160123" sldId="452"/>
-        </pc:sldMkLst>
-      </pc:sldChg>
-    </pc:docChg>
-  </pc:docChgLst>
-  <pc:docChgLst>
-    <pc:chgData name="Hewner, Mike" userId="7f3f83dd-6dfb-4127-a87f-c1714bd4fac9" providerId="ADAL" clId="{76FEDA98-5770-4FC9-97FA-A79D546FBB83}"/>
-    <pc:docChg chg="modSld">
-      <pc:chgData name="Hewner, Mike" userId="7f3f83dd-6dfb-4127-a87f-c1714bd4fac9" providerId="ADAL" clId="{76FEDA98-5770-4FC9-97FA-A79D546FBB83}" dt="2022-02-17T15:52:01.625" v="4" actId="20577"/>
-      <pc:docMkLst>
-        <pc:docMk/>
-      </pc:docMkLst>
-      <pc:sldChg chg="modSp mod">
-        <pc:chgData name="Hewner, Mike" userId="7f3f83dd-6dfb-4127-a87f-c1714bd4fac9" providerId="ADAL" clId="{76FEDA98-5770-4FC9-97FA-A79D546FBB83}" dt="2022-02-17T15:52:01.625" v="4" actId="20577"/>
-        <pc:sldMkLst>
-          <pc:docMk/>
-          <pc:sldMk cId="3041442255" sldId="456"/>
-        </pc:sldMkLst>
-        <pc:spChg chg="mod">
-          <ac:chgData name="Hewner, Mike" userId="7f3f83dd-6dfb-4127-a87f-c1714bd4fac9" providerId="ADAL" clId="{76FEDA98-5770-4FC9-97FA-A79D546FBB83}" dt="2022-02-17T15:52:01.625" v="4" actId="20577"/>
-          <ac:spMkLst>
-            <pc:docMk/>
-            <pc:sldMk cId="3041442255" sldId="456"/>
-            <ac:spMk id="3" creationId="{F443D27E-0E16-482F-B4CC-A5D0813F0C6B}"/>
-          </ac:spMkLst>
-        </pc:spChg>
-      </pc:sldChg>
-    </pc:docChg>
-  </pc:docChgLst>
   <pc:docChgLst>
     <pc:chgData name="Hewner, Mike" userId="7f3f83dd-6dfb-4127-a87f-c1714bd4fac9" providerId="ADAL" clId="{0BFB2295-5BD8-4317-B4D2-52CE0DAFAEB3}"/>
     <pc:docChg chg="custSel addSld delSld modSld">
@@ -637,6 +576,67 @@
             <pc:docMk/>
             <pc:sldMk cId="3737567314" sldId="457"/>
             <ac:spMk id="3" creationId="{734A4FB0-84B6-4BAA-8B7B-51DB89FBE533}"/>
+          </ac:spMkLst>
+        </pc:spChg>
+      </pc:sldChg>
+    </pc:docChg>
+  </pc:docChgLst>
+  <pc:docChgLst>
+    <pc:chgData name="Mike Hewner" userId="7f3f83dd-6dfb-4127-a87f-c1714bd4fac9" providerId="ADAL" clId="{1757374B-378E-457D-BEFA-6C2F4048CEC8}"/>
+    <pc:docChg chg="delSld">
+      <pc:chgData name="Mike Hewner" userId="7f3f83dd-6dfb-4127-a87f-c1714bd4fac9" providerId="ADAL" clId="{1757374B-378E-457D-BEFA-6C2F4048CEC8}" dt="2022-10-31T13:47:56.073" v="1" actId="47"/>
+      <pc:docMkLst>
+        <pc:docMk/>
+      </pc:docMkLst>
+      <pc:sldChg chg="del">
+        <pc:chgData name="Mike Hewner" userId="7f3f83dd-6dfb-4127-a87f-c1714bd4fac9" providerId="ADAL" clId="{1757374B-378E-457D-BEFA-6C2F4048CEC8}" dt="2022-10-31T13:47:56.073" v="1" actId="47"/>
+        <pc:sldMkLst>
+          <pc:docMk/>
+          <pc:sldMk cId="3014537070" sldId="448"/>
+        </pc:sldMkLst>
+      </pc:sldChg>
+      <pc:sldChg chg="del">
+        <pc:chgData name="Mike Hewner" userId="7f3f83dd-6dfb-4127-a87f-c1714bd4fac9" providerId="ADAL" clId="{1757374B-378E-457D-BEFA-6C2F4048CEC8}" dt="2022-10-31T13:47:56.073" v="1" actId="47"/>
+        <pc:sldMkLst>
+          <pc:docMk/>
+          <pc:sldMk cId="387688988" sldId="450"/>
+        </pc:sldMkLst>
+      </pc:sldChg>
+      <pc:sldChg chg="del">
+        <pc:chgData name="Mike Hewner" userId="7f3f83dd-6dfb-4127-a87f-c1714bd4fac9" providerId="ADAL" clId="{1757374B-378E-457D-BEFA-6C2F4048CEC8}" dt="2022-10-31T13:47:56.073" v="1" actId="47"/>
+        <pc:sldMkLst>
+          <pc:docMk/>
+          <pc:sldMk cId="1500992104" sldId="451"/>
+        </pc:sldMkLst>
+      </pc:sldChg>
+      <pc:sldChg chg="del">
+        <pc:chgData name="Mike Hewner" userId="7f3f83dd-6dfb-4127-a87f-c1714bd4fac9" providerId="ADAL" clId="{1757374B-378E-457D-BEFA-6C2F4048CEC8}" dt="2022-10-31T13:47:04.952" v="0" actId="47"/>
+        <pc:sldMkLst>
+          <pc:docMk/>
+          <pc:sldMk cId="2142160123" sldId="452"/>
+        </pc:sldMkLst>
+      </pc:sldChg>
+    </pc:docChg>
+  </pc:docChgLst>
+  <pc:docChgLst>
+    <pc:chgData name="Hewner, Mike" userId="7f3f83dd-6dfb-4127-a87f-c1714bd4fac9" providerId="ADAL" clId="{76FEDA98-5770-4FC9-97FA-A79D546FBB83}"/>
+    <pc:docChg chg="modSld">
+      <pc:chgData name="Hewner, Mike" userId="7f3f83dd-6dfb-4127-a87f-c1714bd4fac9" providerId="ADAL" clId="{76FEDA98-5770-4FC9-97FA-A79D546FBB83}" dt="2022-02-17T15:52:01.625" v="4" actId="20577"/>
+      <pc:docMkLst>
+        <pc:docMk/>
+      </pc:docMkLst>
+      <pc:sldChg chg="modSp mod">
+        <pc:chgData name="Hewner, Mike" userId="7f3f83dd-6dfb-4127-a87f-c1714bd4fac9" providerId="ADAL" clId="{76FEDA98-5770-4FC9-97FA-A79D546FBB83}" dt="2022-02-17T15:52:01.625" v="4" actId="20577"/>
+        <pc:sldMkLst>
+          <pc:docMk/>
+          <pc:sldMk cId="3041442255" sldId="456"/>
+        </pc:sldMkLst>
+        <pc:spChg chg="mod">
+          <ac:chgData name="Hewner, Mike" userId="7f3f83dd-6dfb-4127-a87f-c1714bd4fac9" providerId="ADAL" clId="{76FEDA98-5770-4FC9-97FA-A79D546FBB83}" dt="2022-02-17T15:52:01.625" v="4" actId="20577"/>
+          <ac:spMkLst>
+            <pc:docMk/>
+            <pc:sldMk cId="3041442255" sldId="456"/>
+            <ac:spMk id="3" creationId="{F443D27E-0E16-482F-B4CC-A5D0813F0C6B}"/>
           </ac:spMkLst>
         </pc:spChg>
       </pc:sldChg>
@@ -9514,15 +9514,6 @@
               <a:rPr lang="en-US" dirty="0"/>
               <a:t>I often find it instructive if folks tell me how they came to understand concepts that were difficult for them</a:t>
             </a:r>
-          </a:p>
-          <a:p>
-            <a:r>
-              <a:rPr lang="en-US" dirty="0"/>
-              <a:t>Complaints are useful too – just realize if your complaint is something like “this course should not be a requirement at all” its sort of beyond the scope of what I can accomplish</a:t>
-            </a:r>
-          </a:p>
-          <a:p>
-            <a:endParaRPr lang="en-US" dirty="0"/>
           </a:p>
         </p:txBody>
       </p:sp>

</xml_diff>